<commit_message>
modified icon & start view
</commit_message>
<xml_diff>
--- a/CubeProject/cube_UI.pptx
+++ b/CubeProject/cube_UI.pptx
@@ -2,7 +2,7 @@
 <file path=ppt/presentation.xml><?xml version="1.0" encoding="utf-8"?>
 <p:presentation xmlns:r="http://schemas.openxmlformats.org/officeDocument/2006/relationships" xmlns:c="http://schemas.openxmlformats.org/drawingml/2006/chart" xmlns:a="http://schemas.openxmlformats.org/drawingml/2006/main" xmlns:dgm="http://schemas.openxmlformats.org/drawingml/2006/diagram" xmlns:dsp="http://schemas.microsoft.com/office/drawing/2008/diagram" xmlns:p="http://schemas.openxmlformats.org/presentationml/2006/main" saveSubsetFonts="1">
   <p:sldMasterIdLst>
-    <p:sldMasterId id="2147483733" r:id="rId1"/>
+    <p:sldMasterId id="2147483740" r:id="rId1"/>
   </p:sldMasterIdLst>
   <p:sldIdLst>
     <p:sldId id="256" r:id="rId2"/>
@@ -5323,16 +5323,16 @@
       </p:sp>
       <p:grpSp>
         <p:nvGrpSpPr>
-          <p:cNvPr id="49" name=""/>
+          <p:cNvPr id="53" name=""/>
           <p:cNvGrpSpPr/>
           <p:nvPr/>
         </p:nvGrpSpPr>
         <p:grpSpPr>
           <a:xfrm rot="0">
-            <a:off x="1979676" y="1916811"/>
-            <a:ext cx="3600000" cy="3600000"/>
-            <a:chOff x="1979676" y="1916811"/>
-            <a:chExt cx="3600000" cy="3600000"/>
+            <a:off x="468387" y="-171450"/>
+            <a:ext cx="7560000" cy="7560000"/>
+            <a:chOff x="468387" y="-171450"/>
+            <a:chExt cx="7560000" cy="7560000"/>
           </a:xfrm>
         </p:grpSpPr>
         <p:sp>
@@ -5343,8 +5343,8 @@
           </p:nvSpPr>
           <p:spPr>
             <a:xfrm>
-              <a:off x="1979676" y="1916811"/>
-              <a:ext cx="3600000" cy="3600000"/>
+              <a:off x="468387" y="-171450"/>
+              <a:ext cx="7560000" cy="7560000"/>
             </a:xfrm>
             <a:prstGeom prst="rect">
               <a:avLst/>
@@ -5390,8 +5390,8 @@
           </p:nvSpPr>
           <p:spPr>
             <a:xfrm>
-              <a:off x="4368777" y="2780919"/>
-              <a:ext cx="324000" cy="324000"/>
+              <a:off x="5148218" y="2636901"/>
+              <a:ext cx="648000" cy="648000"/>
             </a:xfrm>
             <a:prstGeom prst="heart">
               <a:avLst/>
@@ -5438,8 +5438,8 @@
           </p:nvSpPr>
           <p:spPr>
             <a:xfrm>
-              <a:off x="3707892" y="3121986"/>
-              <a:ext cx="576000" cy="576000"/>
+              <a:off x="3826448" y="3319035"/>
+              <a:ext cx="1152000" cy="1152000"/>
             </a:xfrm>
             <a:prstGeom prst="diamond">
               <a:avLst/>
@@ -5486,8 +5486,8 @@
           </p:nvSpPr>
           <p:spPr>
             <a:xfrm>
-              <a:off x="4836795" y="2492883"/>
-              <a:ext cx="251999" cy="216000"/>
+              <a:off x="6084254" y="2060829"/>
+              <a:ext cx="503998" cy="432000"/>
             </a:xfrm>
             <a:prstGeom prst="triangle">
               <a:avLst>
@@ -5536,8 +5536,8 @@
           </p:nvSpPr>
           <p:spPr>
             <a:xfrm>
-              <a:off x="2664027" y="3860901"/>
-              <a:ext cx="684000" cy="684000"/>
+              <a:off x="1738718" y="4796865"/>
+              <a:ext cx="1368000" cy="1368000"/>
             </a:xfrm>
             <a:prstGeom prst="pentagon">
               <a:avLst>
@@ -5587,14 +5587,14 @@
           </p:nvSpPr>
           <p:spPr>
             <a:xfrm>
-              <a:off x="2394027" y="3626910"/>
-              <a:ext cx="1224000" cy="1224000"/>
+              <a:off x="1198718" y="4328883"/>
+              <a:ext cx="2448000" cy="2448000"/>
             </a:xfrm>
             <a:prstGeom prst="ellipse">
               <a:avLst/>
             </a:prstGeom>
             <a:noFill/>
-            <a:ln w="28575">
+            <a:ln w="57150">
               <a:solidFill>
                 <a:srgbClr val="777777"/>
               </a:solidFill>
@@ -5626,57 +5626,46 @@
             </a:p>
           </p:txBody>
         </p:sp>
+        <p:sp>
+          <p:nvSpPr>
+            <p:cNvPr id="50" name=""/>
+            <p:cNvSpPr txBox="1"/>
+            <p:nvPr/>
+          </p:nvSpPr>
+          <p:spPr>
+            <a:xfrm>
+              <a:off x="1303020" y="-171443"/>
+              <a:ext cx="5904738" cy="2150738"/>
+            </a:xfrm>
+            <a:prstGeom prst="rect">
+              <a:avLst/>
+            </a:prstGeom>
+          </p:spPr>
+          <p:txBody>
+            <a:bodyPr wrap="square">
+              <a:spAutoFit/>
+            </a:bodyPr>
+            <a:p>
+              <a:pPr algn="ctr">
+                <a:defRPr lang="ko-KR" altLang="en-US"/>
+              </a:pPr>
+              <a:r>
+                <a:rPr lang="en-US" altLang="ko-KR" sz="13500">
+                  <a:latin typeface="Lucida Sans Unicode"/>
+                  <a:ea typeface="Lucida Sans Unicode"/>
+                  <a:cs typeface="Lucida Sans Unicode"/>
+                </a:rPr>
+                <a:t>Holar</a:t>
+              </a:r>
+              <a:endParaRPr lang="en-US" altLang="ko-KR" sz="13500">
+                <a:latin typeface="Lucida Sans Unicode"/>
+                <a:ea typeface="Lucida Sans Unicode"/>
+                <a:cs typeface="Lucida Sans Unicode"/>
+              </a:endParaRPr>
+            </a:p>
+          </p:txBody>
+        </p:sp>
       </p:grpSp>
-      <p:sp>
-        <p:nvSpPr>
-          <p:cNvPr id="41" name=""/>
-          <p:cNvSpPr/>
-          <p:nvPr/>
-        </p:nvSpPr>
-        <p:spPr>
-          <a:xfrm>
-            <a:off x="2987856" y="260657"/>
-            <a:ext cx="432000" cy="432000"/>
-          </a:xfrm>
-          <a:prstGeom prst="leftArrow">
-            <a:avLst>
-              <a:gd name="adj1" fmla="val 50000"/>
-              <a:gd name="adj2" fmla="val 50000"/>
-            </a:avLst>
-          </a:prstGeom>
-          <a:noFill/>
-          <a:ln>
-            <a:solidFill>
-              <a:srgbClr val="777777"/>
-            </a:solidFill>
-          </a:ln>
-        </p:spPr>
-        <p:style>
-          <a:lnRef idx="2">
-            <a:schemeClr val="accent1">
-              <a:shade val="20000"/>
-            </a:schemeClr>
-          </a:lnRef>
-          <a:fillRef idx="1">
-            <a:schemeClr val="accent1"/>
-          </a:fillRef>
-          <a:effectRef idx="0">
-            <a:schemeClr val="accent1"/>
-          </a:effectRef>
-          <a:fontRef idx="minor">
-            <a:schemeClr val="lt1"/>
-          </a:fontRef>
-        </p:style>
-        <p:txBody>
-          <a:bodyPr anchor="ctr"/>
-          <a:p>
-            <a:pPr>
-              <a:defRPr lang="ko-KR" altLang="en-US"/>
-            </a:pPr>
-            <a:endParaRPr lang="en-US"/>
-          </a:p>
-        </p:txBody>
-      </p:sp>
     </p:spTree>
   </p:cSld>
   <p:clrMapOvr>
@@ -5710,20 +5699,164 @@
           <a:chExt cx="0" cy="0"/>
         </a:xfrm>
       </p:grpSpPr>
+      <p:sp>
+        <p:nvSpPr>
+          <p:cNvPr id="17" name=""/>
+          <p:cNvSpPr/>
+          <p:nvPr/>
+        </p:nvSpPr>
+        <p:spPr>
+          <a:xfrm>
+            <a:off x="823769" y="483516"/>
+            <a:ext cx="100774" cy="100774"/>
+          </a:xfrm>
+          <a:prstGeom prst="heart">
+            <a:avLst/>
+          </a:prstGeom>
+          <a:solidFill>
+            <a:srgbClr val="f52525"/>
+          </a:solidFill>
+          <a:ln>
+            <a:noFill/>
+          </a:ln>
+          <a:effectLst/>
+        </p:spPr>
+        <p:style>
+          <a:lnRef idx="2">
+            <a:schemeClr val="accent1">
+              <a:shade val="20000"/>
+            </a:schemeClr>
+          </a:lnRef>
+          <a:fillRef idx="1">
+            <a:schemeClr val="accent1"/>
+          </a:fillRef>
+          <a:effectRef idx="0">
+            <a:schemeClr val="accent1"/>
+          </a:effectRef>
+          <a:fontRef idx="minor">
+            <a:schemeClr val="lt1"/>
+          </a:fontRef>
+        </p:style>
+        <p:txBody>
+          <a:bodyPr anchor="ctr"/>
+          <a:p>
+            <a:pPr>
+              <a:defRPr lang="ko-KR" altLang="en-US"/>
+            </a:pPr>
+            <a:endParaRPr lang="en-US"/>
+          </a:p>
+        </p:txBody>
+      </p:sp>
+      <p:sp>
+        <p:nvSpPr>
+          <p:cNvPr id="19" name=""/>
+          <p:cNvSpPr/>
+          <p:nvPr/>
+        </p:nvSpPr>
+        <p:spPr>
+          <a:xfrm>
+            <a:off x="671024" y="343300"/>
+            <a:ext cx="113919" cy="113919"/>
+          </a:xfrm>
+          <a:prstGeom prst="diamond">
+            <a:avLst/>
+          </a:prstGeom>
+          <a:solidFill>
+            <a:srgbClr val="176ced"/>
+          </a:solidFill>
+          <a:ln>
+            <a:noFill/>
+          </a:ln>
+          <a:effectLst/>
+        </p:spPr>
+        <p:style>
+          <a:lnRef idx="2">
+            <a:schemeClr val="accent1">
+              <a:shade val="20000"/>
+            </a:schemeClr>
+          </a:lnRef>
+          <a:fillRef idx="1">
+            <a:schemeClr val="accent1"/>
+          </a:fillRef>
+          <a:effectRef idx="0">
+            <a:schemeClr val="accent1"/>
+          </a:effectRef>
+          <a:fontRef idx="minor">
+            <a:schemeClr val="lt1"/>
+          </a:fontRef>
+        </p:style>
+        <p:txBody>
+          <a:bodyPr anchor="ctr"/>
+          <a:p>
+            <a:pPr>
+              <a:defRPr lang="ko-KR" altLang="en-US"/>
+            </a:pPr>
+            <a:endParaRPr lang="en-US"/>
+          </a:p>
+        </p:txBody>
+      </p:sp>
+      <p:sp>
+        <p:nvSpPr>
+          <p:cNvPr id="22" name=""/>
+          <p:cNvSpPr/>
+          <p:nvPr/>
+        </p:nvSpPr>
+        <p:spPr>
+          <a:xfrm>
+            <a:off x="671024" y="597444"/>
+            <a:ext cx="113919" cy="113919"/>
+          </a:xfrm>
+          <a:prstGeom prst="triangle">
+            <a:avLst>
+              <a:gd name="adj" fmla="val 50000"/>
+            </a:avLst>
+          </a:prstGeom>
+          <a:solidFill>
+            <a:srgbClr val="ffb505"/>
+          </a:solidFill>
+          <a:ln>
+            <a:noFill/>
+          </a:ln>
+          <a:effectLst/>
+        </p:spPr>
+        <p:style>
+          <a:lnRef idx="2">
+            <a:schemeClr val="accent1">
+              <a:shade val="20000"/>
+            </a:schemeClr>
+          </a:lnRef>
+          <a:fillRef idx="1">
+            <a:schemeClr val="accent1"/>
+          </a:fillRef>
+          <a:effectRef idx="0">
+            <a:schemeClr val="accent1"/>
+          </a:effectRef>
+          <a:fontRef idx="minor">
+            <a:schemeClr val="lt1"/>
+          </a:fontRef>
+        </p:style>
+        <p:txBody>
+          <a:bodyPr anchor="ctr"/>
+          <a:p>
+            <a:pPr>
+              <a:defRPr lang="ko-KR" altLang="en-US"/>
+            </a:pPr>
+            <a:endParaRPr lang="en-US"/>
+          </a:p>
+        </p:txBody>
+      </p:sp>
       <p:grpSp>
         <p:nvGrpSpPr>
-          <p:cNvPr id="51" name=""/>
-          <p:cNvGrpSpPr>
-            <a:grpSpLocks noChangeAspect="1"/>
-          </p:cNvGrpSpPr>
+          <p:cNvPr id="52" name=""/>
+          <p:cNvGrpSpPr/>
           <p:nvPr/>
         </p:nvGrpSpPr>
         <p:grpSpPr>
           <a:xfrm rot="0">
-            <a:off x="508909" y="314829"/>
-            <a:ext cx="438150" cy="438150"/>
-            <a:chOff x="508909" y="314829"/>
-            <a:chExt cx="3600000" cy="3600000"/>
+            <a:off x="1259585" y="314828"/>
+            <a:ext cx="1352550" cy="1352550"/>
+            <a:chOff x="1259586" y="314829"/>
+            <a:chExt cx="438150" cy="438150"/>
           </a:xfrm>
         </p:grpSpPr>
         <p:sp>
@@ -5734,13 +5867,15 @@
           </p:nvSpPr>
           <p:spPr>
             <a:xfrm>
-              <a:off x="508909" y="314829"/>
-              <a:ext cx="3600000" cy="3600000"/>
+              <a:off x="1259586" y="314829"/>
+              <a:ext cx="438150" cy="438150"/>
             </a:xfrm>
             <a:prstGeom prst="rect">
               <a:avLst/>
             </a:prstGeom>
-            <a:noFill/>
+            <a:solidFill>
+              <a:schemeClr val="bg1"/>
+            </a:solidFill>
             <a:ln>
               <a:noFill/>
             </a:ln>
@@ -5773,160 +5908,14 @@
         </p:sp>
         <p:sp>
           <p:nvSpPr>
-            <p:cNvPr id="17" name=""/>
-            <p:cNvSpPr/>
-            <p:nvPr/>
-          </p:nvSpPr>
-          <p:spPr>
-            <a:xfrm>
-              <a:off x="3095919" y="1700829"/>
-              <a:ext cx="828000" cy="828000"/>
-            </a:xfrm>
-            <a:prstGeom prst="heart">
-              <a:avLst/>
-            </a:prstGeom>
-            <a:solidFill>
-              <a:srgbClr val="f52525"/>
-            </a:solidFill>
-            <a:ln>
-              <a:noFill/>
-            </a:ln>
-            <a:effectLst/>
-          </p:spPr>
-          <p:style>
-            <a:lnRef idx="2">
-              <a:schemeClr val="accent1">
-                <a:shade val="20000"/>
-              </a:schemeClr>
-            </a:lnRef>
-            <a:fillRef idx="1">
-              <a:schemeClr val="accent1"/>
-            </a:fillRef>
-            <a:effectRef idx="0">
-              <a:schemeClr val="accent1"/>
-            </a:effectRef>
-            <a:fontRef idx="minor">
-              <a:schemeClr val="lt1"/>
-            </a:fontRef>
-          </p:style>
-          <p:txBody>
-            <a:bodyPr anchor="ctr"/>
-            <a:p>
-              <a:pPr>
-                <a:defRPr lang="ko-KR" altLang="en-US"/>
-              </a:pPr>
-              <a:endParaRPr lang="en-US"/>
-            </a:p>
-          </p:txBody>
-        </p:sp>
-        <p:sp>
-          <p:nvSpPr>
-            <p:cNvPr id="19" name=""/>
-            <p:cNvSpPr/>
-            <p:nvPr/>
-          </p:nvSpPr>
-          <p:spPr>
-            <a:xfrm>
-              <a:off x="1840909" y="548757"/>
-              <a:ext cx="936000" cy="936000"/>
-            </a:xfrm>
-            <a:prstGeom prst="diamond">
-              <a:avLst/>
-            </a:prstGeom>
-            <a:solidFill>
-              <a:srgbClr val="176ced"/>
-            </a:solidFill>
-            <a:ln>
-              <a:noFill/>
-            </a:ln>
-            <a:effectLst/>
-          </p:spPr>
-          <p:style>
-            <a:lnRef idx="2">
-              <a:schemeClr val="accent1">
-                <a:shade val="20000"/>
-              </a:schemeClr>
-            </a:lnRef>
-            <a:fillRef idx="1">
-              <a:schemeClr val="accent1"/>
-            </a:fillRef>
-            <a:effectRef idx="0">
-              <a:schemeClr val="accent1"/>
-            </a:effectRef>
-            <a:fontRef idx="minor">
-              <a:schemeClr val="lt1"/>
-            </a:fontRef>
-          </p:style>
-          <p:txBody>
-            <a:bodyPr anchor="ctr"/>
-            <a:p>
-              <a:pPr>
-                <a:defRPr lang="ko-KR" altLang="en-US"/>
-              </a:pPr>
-              <a:endParaRPr lang="en-US"/>
-            </a:p>
-          </p:txBody>
-        </p:sp>
-        <p:sp>
-          <p:nvSpPr>
-            <p:cNvPr id="22" name=""/>
-            <p:cNvSpPr/>
-            <p:nvPr/>
-          </p:nvSpPr>
-          <p:spPr>
-            <a:xfrm>
-              <a:off x="1840909" y="2636901"/>
-              <a:ext cx="936000" cy="936000"/>
-            </a:xfrm>
-            <a:prstGeom prst="triangle">
-              <a:avLst>
-                <a:gd name="adj" fmla="val 50000"/>
-              </a:avLst>
-            </a:prstGeom>
-            <a:solidFill>
-              <a:srgbClr val="ffb505"/>
-            </a:solidFill>
-            <a:ln>
-              <a:noFill/>
-            </a:ln>
-            <a:effectLst/>
-          </p:spPr>
-          <p:style>
-            <a:lnRef idx="2">
-              <a:schemeClr val="accent1">
-                <a:shade val="20000"/>
-              </a:schemeClr>
-            </a:lnRef>
-            <a:fillRef idx="1">
-              <a:schemeClr val="accent1"/>
-            </a:fillRef>
-            <a:effectRef idx="0">
-              <a:schemeClr val="accent1"/>
-            </a:effectRef>
-            <a:fontRef idx="minor">
-              <a:schemeClr val="lt1"/>
-            </a:fontRef>
-          </p:style>
-          <p:txBody>
-            <a:bodyPr anchor="ctr"/>
-            <a:p>
-              <a:pPr>
-                <a:defRPr lang="ko-KR" altLang="en-US"/>
-              </a:pPr>
-              <a:endParaRPr lang="en-US"/>
-            </a:p>
-          </p:txBody>
-        </p:sp>
-        <p:sp>
-          <p:nvSpPr>
             <p:cNvPr id="14" name=""/>
             <p:cNvSpPr/>
             <p:nvPr/>
           </p:nvSpPr>
           <p:spPr>
             <a:xfrm>
-              <a:off x="923260" y="1736819"/>
-              <a:ext cx="684000" cy="684000"/>
+              <a:off x="1395004" y="445715"/>
+              <a:ext cx="180000" cy="180000"/>
             </a:xfrm>
             <a:prstGeom prst="pentagon">
               <a:avLst>
@@ -5976,14 +5965,14 @@
           </p:nvSpPr>
           <p:spPr>
             <a:xfrm>
-              <a:off x="653260" y="1502828"/>
-              <a:ext cx="1224000" cy="1224000"/>
+              <a:off x="1322070" y="378183"/>
+              <a:ext cx="324000" cy="324000"/>
             </a:xfrm>
             <a:prstGeom prst="ellipse">
               <a:avLst/>
             </a:prstGeom>
             <a:noFill/>
-            <a:ln w="12700">
+            <a:ln w="28575">
               <a:solidFill>
                 <a:srgbClr val="777777"/>
               </a:solidFill>

</xml_diff>